<commit_message>
things i forgot to install
</commit_message>
<xml_diff>
--- a/course-material/personal-setup.pptx
+++ b/course-material/personal-setup.pptx
@@ -13,7 +13,8 @@
     <p:sldId id="260" r:id="rId7"/>
     <p:sldId id="263" r:id="rId8"/>
     <p:sldId id="264" r:id="rId9"/>
-    <p:sldId id="261" r:id="rId10"/>
+    <p:sldId id="265" r:id="rId10"/>
+    <p:sldId id="261" r:id="rId11"/>
   </p:sldIdLst>
   <p:sldSz cx="12192000" cy="6858000"/>
   <p:notesSz cx="6858000" cy="9144000"/>
@@ -267,7 +268,7 @@
           <a:p>
             <a:fld id="{0A70EEE9-CB05-5E4B-AF7A-E82B7595DC6C}" type="datetimeFigureOut">
               <a:rPr lang="en-GB" smtClean="0"/>
-              <a:t>04/02/2021</a:t>
+              <a:t>03/03/2021</a:t>
             </a:fld>
             <a:endParaRPr lang="en-GB"/>
           </a:p>
@@ -465,7 +466,7 @@
           <a:p>
             <a:fld id="{0A70EEE9-CB05-5E4B-AF7A-E82B7595DC6C}" type="datetimeFigureOut">
               <a:rPr lang="en-GB" smtClean="0"/>
-              <a:t>04/02/2021</a:t>
+              <a:t>03/03/2021</a:t>
             </a:fld>
             <a:endParaRPr lang="en-GB"/>
           </a:p>
@@ -673,7 +674,7 @@
           <a:p>
             <a:fld id="{0A70EEE9-CB05-5E4B-AF7A-E82B7595DC6C}" type="datetimeFigureOut">
               <a:rPr lang="en-GB" smtClean="0"/>
-              <a:t>04/02/2021</a:t>
+              <a:t>03/03/2021</a:t>
             </a:fld>
             <a:endParaRPr lang="en-GB"/>
           </a:p>
@@ -871,7 +872,7 @@
           <a:p>
             <a:fld id="{0A70EEE9-CB05-5E4B-AF7A-E82B7595DC6C}" type="datetimeFigureOut">
               <a:rPr lang="en-GB" smtClean="0"/>
-              <a:t>04/02/2021</a:t>
+              <a:t>03/03/2021</a:t>
             </a:fld>
             <a:endParaRPr lang="en-GB"/>
           </a:p>
@@ -1146,7 +1147,7 @@
           <a:p>
             <a:fld id="{0A70EEE9-CB05-5E4B-AF7A-E82B7595DC6C}" type="datetimeFigureOut">
               <a:rPr lang="en-GB" smtClean="0"/>
-              <a:t>04/02/2021</a:t>
+              <a:t>03/03/2021</a:t>
             </a:fld>
             <a:endParaRPr lang="en-GB"/>
           </a:p>
@@ -1411,7 +1412,7 @@
           <a:p>
             <a:fld id="{0A70EEE9-CB05-5E4B-AF7A-E82B7595DC6C}" type="datetimeFigureOut">
               <a:rPr lang="en-GB" smtClean="0"/>
-              <a:t>04/02/2021</a:t>
+              <a:t>03/03/2021</a:t>
             </a:fld>
             <a:endParaRPr lang="en-GB"/>
           </a:p>
@@ -1823,7 +1824,7 @@
           <a:p>
             <a:fld id="{0A70EEE9-CB05-5E4B-AF7A-E82B7595DC6C}" type="datetimeFigureOut">
               <a:rPr lang="en-GB" smtClean="0"/>
-              <a:t>04/02/2021</a:t>
+              <a:t>03/03/2021</a:t>
             </a:fld>
             <a:endParaRPr lang="en-GB"/>
           </a:p>
@@ -1964,7 +1965,7 @@
           <a:p>
             <a:fld id="{0A70EEE9-CB05-5E4B-AF7A-E82B7595DC6C}" type="datetimeFigureOut">
               <a:rPr lang="en-GB" smtClean="0"/>
-              <a:t>04/02/2021</a:t>
+              <a:t>03/03/2021</a:t>
             </a:fld>
             <a:endParaRPr lang="en-GB"/>
           </a:p>
@@ -2077,7 +2078,7 @@
           <a:p>
             <a:fld id="{0A70EEE9-CB05-5E4B-AF7A-E82B7595DC6C}" type="datetimeFigureOut">
               <a:rPr lang="en-GB" smtClean="0"/>
-              <a:t>04/02/2021</a:t>
+              <a:t>03/03/2021</a:t>
             </a:fld>
             <a:endParaRPr lang="en-GB"/>
           </a:p>
@@ -2388,7 +2389,7 @@
           <a:p>
             <a:fld id="{0A70EEE9-CB05-5E4B-AF7A-E82B7595DC6C}" type="datetimeFigureOut">
               <a:rPr lang="en-GB" smtClean="0"/>
-              <a:t>04/02/2021</a:t>
+              <a:t>03/03/2021</a:t>
             </a:fld>
             <a:endParaRPr lang="en-GB"/>
           </a:p>
@@ -2676,7 +2677,7 @@
           <a:p>
             <a:fld id="{0A70EEE9-CB05-5E4B-AF7A-E82B7595DC6C}" type="datetimeFigureOut">
               <a:rPr lang="en-GB" smtClean="0"/>
-              <a:t>04/02/2021</a:t>
+              <a:t>03/03/2021</a:t>
             </a:fld>
             <a:endParaRPr lang="en-GB"/>
           </a:p>
@@ -2917,7 +2918,7 @@
           <a:p>
             <a:fld id="{0A70EEE9-CB05-5E4B-AF7A-E82B7595DC6C}" type="datetimeFigureOut">
               <a:rPr lang="en-GB" smtClean="0"/>
-              <a:t>04/02/2021</a:t>
+              <a:t>03/03/2021</a:t>
             </a:fld>
             <a:endParaRPr lang="en-GB"/>
           </a:p>
@@ -3476,6 +3477,228 @@
 </p:sld>
 </file>
 
+<file path=ppt/slides/slide10.xml><?xml version="1.0" encoding="utf-8"?>
+<p:sld xmlns:a="http://schemas.openxmlformats.org/drawingml/2006/main" xmlns:r="http://schemas.openxmlformats.org/officeDocument/2006/relationships" xmlns:p="http://schemas.openxmlformats.org/presentationml/2006/main">
+  <p:cSld>
+    <p:spTree>
+      <p:nvGrpSpPr>
+        <p:cNvPr id="1" name=""/>
+        <p:cNvGrpSpPr/>
+        <p:nvPr/>
+      </p:nvGrpSpPr>
+      <p:grpSpPr>
+        <a:xfrm>
+          <a:off x="0" y="0"/>
+          <a:ext cx="0" cy="0"/>
+          <a:chOff x="0" y="0"/>
+          <a:chExt cx="0" cy="0"/>
+        </a:xfrm>
+      </p:grpSpPr>
+      <p:sp>
+        <p:nvSpPr>
+          <p:cNvPr id="2" name="Title 1">
+            <a:extLst>
+              <a:ext uri="{FF2B5EF4-FFF2-40B4-BE49-F238E27FC236}">
+                <a16:creationId xmlns:a16="http://schemas.microsoft.com/office/drawing/2014/main" id="{FB07463F-6CBB-CD42-8F85-52F4E574D143}"/>
+              </a:ext>
+            </a:extLst>
+          </p:cNvPr>
+          <p:cNvSpPr>
+            <a:spLocks noGrp="1"/>
+          </p:cNvSpPr>
+          <p:nvPr>
+            <p:ph type="title"/>
+          </p:nvPr>
+        </p:nvSpPr>
+        <p:spPr/>
+        <p:txBody>
+          <a:bodyPr/>
+          <a:lstStyle/>
+          <a:p>
+            <a:r>
+              <a:rPr lang="en-GB" dirty="0"/>
+              <a:t>you’re good to go </a:t>
+            </a:r>
+          </a:p>
+        </p:txBody>
+      </p:sp>
+      <p:sp>
+        <p:nvSpPr>
+          <p:cNvPr id="3" name="Content Placeholder 2">
+            <a:extLst>
+              <a:ext uri="{FF2B5EF4-FFF2-40B4-BE49-F238E27FC236}">
+                <a16:creationId xmlns:a16="http://schemas.microsoft.com/office/drawing/2014/main" id="{BC606D11-07E8-6E4F-ADB0-F62A77F2B032}"/>
+              </a:ext>
+            </a:extLst>
+          </p:cNvPr>
+          <p:cNvSpPr>
+            <a:spLocks noGrp="1"/>
+          </p:cNvSpPr>
+          <p:nvPr>
+            <p:ph idx="1"/>
+          </p:nvPr>
+        </p:nvSpPr>
+        <p:spPr/>
+        <p:txBody>
+          <a:bodyPr/>
+          <a:lstStyle/>
+          <a:p>
+            <a:r>
+              <a:rPr lang="en-GB" dirty="0"/>
+              <a:t>browse the </a:t>
+            </a:r>
+            <a:r>
+              <a:rPr lang="en-GB" dirty="0" err="1">
+                <a:latin typeface="Menlo" panose="020B0609030804020204" pitchFamily="49" charset="0"/>
+                <a:ea typeface="Menlo" panose="020B0609030804020204" pitchFamily="49" charset="0"/>
+                <a:cs typeface="Menlo" panose="020B0609030804020204" pitchFamily="49" charset="0"/>
+              </a:rPr>
+              <a:t>micc</a:t>
+            </a:r>
+            <a:r>
+              <a:rPr lang="en-GB" dirty="0"/>
+              <a:t> tutorials</a:t>
+            </a:r>
+          </a:p>
+          <a:p>
+            <a:pPr lvl="1"/>
+            <a:r>
+              <a:rPr lang="en-GB" dirty="0"/>
+              <a:t>at </a:t>
+            </a:r>
+            <a:r>
+              <a:rPr lang="en-GB" dirty="0">
+                <a:hlinkClick r:id="rId2"/>
+              </a:rPr>
+              <a:t>https://micc.readthedocs.io/en/master/devenv.html</a:t>
+            </a:r>
+            <a:r>
+              <a:rPr lang="en-GB" dirty="0"/>
+              <a:t> </a:t>
+            </a:r>
+          </a:p>
+          <a:p>
+            <a:pPr lvl="1"/>
+            <a:r>
+              <a:rPr lang="en-GB" dirty="0"/>
+              <a:t>or in the course’s git repository</a:t>
+            </a:r>
+          </a:p>
+          <a:p>
+            <a:pPr lvl="2"/>
+            <a:r>
+              <a:rPr lang="en-GB" dirty="0">
+                <a:latin typeface="Menlo" panose="020B0609030804020204" pitchFamily="49" charset="0"/>
+                <a:ea typeface="Menlo" panose="020B0609030804020204" pitchFamily="49" charset="0"/>
+                <a:cs typeface="Menlo" panose="020B0609030804020204" pitchFamily="49" charset="0"/>
+              </a:rPr>
+              <a:t>$ cd workspace</a:t>
+            </a:r>
+          </a:p>
+          <a:p>
+            <a:pPr lvl="2"/>
+            <a:r>
+              <a:rPr lang="en-GB" dirty="0">
+                <a:latin typeface="Menlo" panose="020B0609030804020204" pitchFamily="49" charset="0"/>
+                <a:ea typeface="Menlo" panose="020B0609030804020204" pitchFamily="49" charset="0"/>
+                <a:cs typeface="Menlo" panose="020B0609030804020204" pitchFamily="49" charset="0"/>
+              </a:rPr>
+              <a:t>$ git clone </a:t>
+            </a:r>
+            <a:r>
+              <a:rPr lang="en-GB" dirty="0">
+                <a:latin typeface="Menlo" panose="020B0609030804020204" pitchFamily="49" charset="0"/>
+                <a:ea typeface="Menlo" panose="020B0609030804020204" pitchFamily="49" charset="0"/>
+                <a:cs typeface="Menlo" panose="020B0609030804020204" pitchFamily="49" charset="0"/>
+                <a:hlinkClick r:id="rId3"/>
+              </a:rPr>
+              <a:t>https://github.com/etijskens/pp</a:t>
+            </a:r>
+            <a:endParaRPr lang="en-GB" dirty="0">
+              <a:latin typeface="Menlo" panose="020B0609030804020204" pitchFamily="49" charset="0"/>
+              <a:ea typeface="Menlo" panose="020B0609030804020204" pitchFamily="49" charset="0"/>
+              <a:cs typeface="Menlo" panose="020B0609030804020204" pitchFamily="49" charset="0"/>
+            </a:endParaRPr>
+          </a:p>
+          <a:p>
+            <a:pPr lvl="2"/>
+            <a:r>
+              <a:rPr lang="en-GB" dirty="0">
+                <a:latin typeface="Menlo" panose="020B0609030804020204" pitchFamily="49" charset="0"/>
+                <a:ea typeface="Menlo" panose="020B0609030804020204" pitchFamily="49" charset="0"/>
+                <a:cs typeface="Menlo" panose="020B0609030804020204" pitchFamily="49" charset="0"/>
+              </a:rPr>
+              <a:t>$ </a:t>
+            </a:r>
+            <a:r>
+              <a:rPr lang="en-GB" dirty="0" err="1">
+                <a:latin typeface="Menlo" panose="020B0609030804020204" pitchFamily="49" charset="0"/>
+                <a:ea typeface="Menlo" panose="020B0609030804020204" pitchFamily="49" charset="0"/>
+                <a:cs typeface="Menlo" panose="020B0609030804020204" pitchFamily="49" charset="0"/>
+              </a:rPr>
+              <a:t>xdg</a:t>
+            </a:r>
+            <a:r>
+              <a:rPr lang="en-GB" dirty="0">
+                <a:latin typeface="Menlo" panose="020B0609030804020204" pitchFamily="49" charset="0"/>
+                <a:ea typeface="Menlo" panose="020B0609030804020204" pitchFamily="49" charset="0"/>
+                <a:cs typeface="Menlo" panose="020B0609030804020204" pitchFamily="49" charset="0"/>
+              </a:rPr>
+              <a:t>-open pp/course-material/</a:t>
+            </a:r>
+            <a:r>
+              <a:rPr lang="en-GB" dirty="0" err="1">
+                <a:latin typeface="Menlo" panose="020B0609030804020204" pitchFamily="49" charset="0"/>
+                <a:ea typeface="Menlo" panose="020B0609030804020204" pitchFamily="49" charset="0"/>
+                <a:cs typeface="Menlo" panose="020B0609030804020204" pitchFamily="49" charset="0"/>
+              </a:rPr>
+              <a:t>micc</a:t>
+            </a:r>
+            <a:r>
+              <a:rPr lang="en-GB" dirty="0">
+                <a:latin typeface="Menlo" panose="020B0609030804020204" pitchFamily="49" charset="0"/>
+                <a:ea typeface="Menlo" panose="020B0609030804020204" pitchFamily="49" charset="0"/>
+                <a:cs typeface="Menlo" panose="020B0609030804020204" pitchFamily="49" charset="0"/>
+              </a:rPr>
+              <a:t>-documentation/</a:t>
+            </a:r>
+            <a:r>
+              <a:rPr lang="en-GB" dirty="0" err="1">
+                <a:latin typeface="Menlo" panose="020B0609030804020204" pitchFamily="49" charset="0"/>
+                <a:ea typeface="Menlo" panose="020B0609030804020204" pitchFamily="49" charset="0"/>
+                <a:cs typeface="Menlo" panose="020B0609030804020204" pitchFamily="49" charset="0"/>
+              </a:rPr>
+              <a:t>index.html</a:t>
+            </a:r>
+            <a:endParaRPr lang="en-GB" dirty="0">
+              <a:latin typeface="Menlo" panose="020B0609030804020204" pitchFamily="49" charset="0"/>
+              <a:ea typeface="Menlo" panose="020B0609030804020204" pitchFamily="49" charset="0"/>
+              <a:cs typeface="Menlo" panose="020B0609030804020204" pitchFamily="49" charset="0"/>
+            </a:endParaRPr>
+          </a:p>
+          <a:p>
+            <a:pPr lvl="2"/>
+            <a:endParaRPr lang="en-GB" dirty="0">
+              <a:latin typeface="Menlo" panose="020B0609030804020204" pitchFamily="49" charset="0"/>
+              <a:ea typeface="Menlo" panose="020B0609030804020204" pitchFamily="49" charset="0"/>
+              <a:cs typeface="Menlo" panose="020B0609030804020204" pitchFamily="49" charset="0"/>
+            </a:endParaRPr>
+          </a:p>
+        </p:txBody>
+      </p:sp>
+    </p:spTree>
+    <p:extLst>
+      <p:ext uri="{BB962C8B-B14F-4D97-AF65-F5344CB8AC3E}">
+        <p14:creationId xmlns:p14="http://schemas.microsoft.com/office/powerpoint/2010/main" val="355608632"/>
+      </p:ext>
+    </p:extLst>
+  </p:cSld>
+  <p:clrMapOvr>
+    <a:masterClrMapping/>
+  </p:clrMapOvr>
+</p:sld>
+</file>
+
 <file path=ppt/slides/slide2.xml><?xml version="1.0" encoding="utf-8"?>
 <p:sld xmlns:a="http://schemas.openxmlformats.org/drawingml/2006/main" xmlns:r="http://schemas.openxmlformats.org/officeDocument/2006/relationships" xmlns:p="http://schemas.openxmlformats.org/presentationml/2006/main">
   <p:cSld>
@@ -5001,7 +5224,7 @@
           <p:cNvPr id="2" name="Title 1">
             <a:extLst>
               <a:ext uri="{FF2B5EF4-FFF2-40B4-BE49-F238E27FC236}">
-                <a16:creationId xmlns:a16="http://schemas.microsoft.com/office/drawing/2014/main" id="{FB07463F-6CBB-CD42-8F85-52F4E574D143}"/>
+                <a16:creationId xmlns:a16="http://schemas.microsoft.com/office/drawing/2014/main" id="{C913B9B7-6037-9A48-BFA0-EDCE0FB93744}"/>
               </a:ext>
             </a:extLst>
           </p:cNvPr>
@@ -5018,8 +5241,12 @@
           <a:lstStyle/>
           <a:p>
             <a:r>
-              <a:rPr lang="en-GB" dirty="0"/>
-              <a:t>you’re good to go </a:t>
+              <a:rPr lang="en-GB"/>
+              <a:t>Things </a:t>
+            </a:r>
+            <a:r>
+              <a:rPr lang="en-GB" dirty="0"/>
+              <a:t>I forgot to install …</a:t>
             </a:r>
           </a:p>
         </p:txBody>
@@ -5029,7 +5256,7 @@
           <p:cNvPr id="3" name="Content Placeholder 2">
             <a:extLst>
               <a:ext uri="{FF2B5EF4-FFF2-40B4-BE49-F238E27FC236}">
-                <a16:creationId xmlns:a16="http://schemas.microsoft.com/office/drawing/2014/main" id="{BC606D11-07E8-6E4F-ADB0-F62A77F2B032}"/>
+                <a16:creationId xmlns:a16="http://schemas.microsoft.com/office/drawing/2014/main" id="{CE9DA791-3F8E-B24A-9507-336B46AAD799}"/>
               </a:ext>
             </a:extLst>
           </p:cNvPr>
@@ -5046,152 +5273,79 @@
           <a:lstStyle/>
           <a:p>
             <a:r>
-              <a:rPr lang="en-GB" dirty="0"/>
-              <a:t>browse the </a:t>
-            </a:r>
-            <a:r>
-              <a:rPr lang="en-GB" dirty="0" err="1">
-                <a:latin typeface="Menlo" panose="020B0609030804020204" pitchFamily="49" charset="0"/>
-                <a:ea typeface="Menlo" panose="020B0609030804020204" pitchFamily="49" charset="0"/>
-                <a:cs typeface="Menlo" panose="020B0609030804020204" pitchFamily="49" charset="0"/>
-              </a:rPr>
-              <a:t>micc</a:t>
-            </a:r>
-            <a:r>
-              <a:rPr lang="en-GB" dirty="0"/>
-              <a:t> tutorials</a:t>
+              <a:rPr lang="en-GB" dirty="0" err="1"/>
+              <a:t>openmpi</a:t>
+            </a:r>
+            <a:r>
+              <a:rPr lang="en-GB" dirty="0"/>
+              <a:t>:</a:t>
             </a:r>
           </a:p>
           <a:p>
             <a:pPr lvl="1"/>
             <a:r>
               <a:rPr lang="en-GB" dirty="0"/>
-              <a:t>at </a:t>
-            </a:r>
-            <a:r>
-              <a:rPr lang="en-GB" dirty="0">
-                <a:hlinkClick r:id="rId2"/>
-              </a:rPr>
-              <a:t>https://micc.readthedocs.io/en/master/devenv.html</a:t>
-            </a:r>
-            <a:r>
-              <a:rPr lang="en-GB" dirty="0"/>
-              <a:t> </a:t>
-            </a:r>
-          </a:p>
-          <a:p>
-            <a:pPr lvl="1"/>
-            <a:r>
-              <a:rPr lang="en-GB" dirty="0"/>
-              <a:t>or in the course’s git repository</a:t>
-            </a:r>
-          </a:p>
-          <a:p>
-            <a:pPr lvl="2"/>
-            <a:r>
-              <a:rPr lang="en-GB" dirty="0">
-                <a:latin typeface="Menlo" panose="020B0609030804020204" pitchFamily="49" charset="0"/>
-                <a:ea typeface="Menlo" panose="020B0609030804020204" pitchFamily="49" charset="0"/>
-                <a:cs typeface="Menlo" panose="020B0609030804020204" pitchFamily="49" charset="0"/>
-              </a:rPr>
-              <a:t>$ cd workspace</a:t>
-            </a:r>
-          </a:p>
-          <a:p>
-            <a:pPr lvl="2"/>
-            <a:r>
-              <a:rPr lang="en-GB" dirty="0">
-                <a:latin typeface="Menlo" panose="020B0609030804020204" pitchFamily="49" charset="0"/>
-                <a:ea typeface="Menlo" panose="020B0609030804020204" pitchFamily="49" charset="0"/>
-                <a:cs typeface="Menlo" panose="020B0609030804020204" pitchFamily="49" charset="0"/>
-              </a:rPr>
-              <a:t>$ git clone </a:t>
-            </a:r>
-            <a:r>
-              <a:rPr lang="en-GB" dirty="0">
-                <a:latin typeface="Menlo" panose="020B0609030804020204" pitchFamily="49" charset="0"/>
-                <a:ea typeface="Menlo" panose="020B0609030804020204" pitchFamily="49" charset="0"/>
-                <a:cs typeface="Menlo" panose="020B0609030804020204" pitchFamily="49" charset="0"/>
-                <a:hlinkClick r:id="rId3"/>
-              </a:rPr>
-              <a:t>https://github.com/etijskens/pp</a:t>
-            </a:r>
-            <a:endParaRPr lang="en-GB" dirty="0">
-              <a:latin typeface="Menlo" panose="020B0609030804020204" pitchFamily="49" charset="0"/>
-              <a:ea typeface="Menlo" panose="020B0609030804020204" pitchFamily="49" charset="0"/>
-              <a:cs typeface="Menlo" panose="020B0609030804020204" pitchFamily="49" charset="0"/>
-            </a:endParaRPr>
-          </a:p>
-          <a:p>
-            <a:pPr lvl="2"/>
-            <a:r>
-              <a:rPr lang="en-GB" dirty="0">
-                <a:latin typeface="Menlo" panose="020B0609030804020204" pitchFamily="49" charset="0"/>
-                <a:ea typeface="Menlo" panose="020B0609030804020204" pitchFamily="49" charset="0"/>
-                <a:cs typeface="Menlo" panose="020B0609030804020204" pitchFamily="49" charset="0"/>
-              </a:rPr>
-              <a:t>$ </a:t>
-            </a:r>
-            <a:r>
-              <a:rPr lang="en-GB" dirty="0" err="1">
-                <a:latin typeface="Menlo" panose="020B0609030804020204" pitchFamily="49" charset="0"/>
-                <a:ea typeface="Menlo" panose="020B0609030804020204" pitchFamily="49" charset="0"/>
-                <a:cs typeface="Menlo" panose="020B0609030804020204" pitchFamily="49" charset="0"/>
-              </a:rPr>
-              <a:t>xdg</a:t>
-            </a:r>
-            <a:r>
-              <a:rPr lang="en-GB" dirty="0">
-                <a:latin typeface="Menlo" panose="020B0609030804020204" pitchFamily="49" charset="0"/>
-                <a:ea typeface="Menlo" panose="020B0609030804020204" pitchFamily="49" charset="0"/>
-                <a:cs typeface="Menlo" panose="020B0609030804020204" pitchFamily="49" charset="0"/>
-              </a:rPr>
-              <a:t>-open pp/course-material/</a:t>
-            </a:r>
-            <a:r>
-              <a:rPr lang="en-GB" dirty="0" err="1">
-                <a:latin typeface="Menlo" panose="020B0609030804020204" pitchFamily="49" charset="0"/>
-                <a:ea typeface="Menlo" panose="020B0609030804020204" pitchFamily="49" charset="0"/>
-                <a:cs typeface="Menlo" panose="020B0609030804020204" pitchFamily="49" charset="0"/>
-              </a:rPr>
-              <a:t>micc</a:t>
-            </a:r>
-            <a:r>
-              <a:rPr lang="en-GB" dirty="0">
-                <a:latin typeface="Menlo" panose="020B0609030804020204" pitchFamily="49" charset="0"/>
-                <a:ea typeface="Menlo" panose="020B0609030804020204" pitchFamily="49" charset="0"/>
-                <a:cs typeface="Menlo" panose="020B0609030804020204" pitchFamily="49" charset="0"/>
-              </a:rPr>
-              <a:t>-documentation/</a:t>
-            </a:r>
-            <a:r>
-              <a:rPr lang="en-GB" dirty="0" err="1">
-                <a:latin typeface="Menlo" panose="020B0609030804020204" pitchFamily="49" charset="0"/>
-                <a:ea typeface="Menlo" panose="020B0609030804020204" pitchFamily="49" charset="0"/>
-                <a:cs typeface="Menlo" panose="020B0609030804020204" pitchFamily="49" charset="0"/>
-              </a:rPr>
-              <a:t>index.html</a:t>
-            </a:r>
-            <a:endParaRPr lang="en-GB" dirty="0">
-              <a:latin typeface="Menlo" panose="020B0609030804020204" pitchFamily="49" charset="0"/>
-              <a:ea typeface="Menlo" panose="020B0609030804020204" pitchFamily="49" charset="0"/>
-              <a:cs typeface="Menlo" panose="020B0609030804020204" pitchFamily="49" charset="0"/>
-            </a:endParaRPr>
-          </a:p>
-          <a:p>
-            <a:pPr lvl="2"/>
-            <a:endParaRPr lang="en-GB" dirty="0">
-              <a:latin typeface="Menlo" panose="020B0609030804020204" pitchFamily="49" charset="0"/>
-              <a:ea typeface="Menlo" panose="020B0609030804020204" pitchFamily="49" charset="0"/>
-              <a:cs typeface="Menlo" panose="020B0609030804020204" pitchFamily="49" charset="0"/>
-            </a:endParaRPr>
+              <a:t>Open terminal and execute these commands (</a:t>
+            </a:r>
+            <a:r>
+              <a:rPr lang="en-GB" dirty="0" err="1"/>
+              <a:t>sudo</a:t>
+            </a:r>
+            <a:r>
+              <a:rPr lang="en-GB" dirty="0"/>
+              <a:t> password is </a:t>
+            </a:r>
+            <a:r>
+              <a:rPr lang="en-GB" dirty="0" err="1"/>
+              <a:t>calcua@ua</a:t>
+            </a:r>
+            <a:r>
+              <a:rPr lang="en-GB" dirty="0"/>
+              <a:t>)</a:t>
+            </a:r>
+          </a:p>
+          <a:p>
+            <a:pPr lvl="1">
+              <a:buFont typeface="System Font Regular"/>
+              <a:buChar char="&gt;"/>
+            </a:pPr>
+            <a:r>
+              <a:rPr lang="en-GB" dirty="0" err="1"/>
+              <a:t>sudo</a:t>
+            </a:r>
+            <a:r>
+              <a:rPr lang="en-GB" dirty="0"/>
+              <a:t> install </a:t>
+            </a:r>
+            <a:r>
+              <a:rPr lang="en-GB" dirty="0" err="1"/>
+              <a:t>openmpi</a:t>
+            </a:r>
+            <a:r>
+              <a:rPr lang="en-GB" dirty="0"/>
+              <a:t>-bin </a:t>
+            </a:r>
+            <a:r>
+              <a:rPr lang="en-GB" dirty="0" err="1"/>
+              <a:t>libopenmpi</a:t>
+            </a:r>
+            <a:r>
+              <a:rPr lang="en-GB" dirty="0"/>
+              <a:t>-dev</a:t>
+            </a:r>
+          </a:p>
+          <a:p>
+            <a:pPr marL="457200" lvl="1" indent="0">
+              <a:buNone/>
+            </a:pPr>
+            <a:endParaRPr lang="en-GB" dirty="0"/>
           </a:p>
         </p:txBody>
       </p:sp>
     </p:spTree>
     <p:extLst>
       <p:ext uri="{BB962C8B-B14F-4D97-AF65-F5344CB8AC3E}">
-        <p14:creationId xmlns:p14="http://schemas.microsoft.com/office/powerpoint/2010/main" val="355608632"/>
+        <p14:creationId xmlns:p14="http://schemas.microsoft.com/office/powerpoint/2010/main" val="2152779959"/>
       </p:ext>
     </p:extLst>
   </p:cSld>

</xml_diff>